<commit_message>
3:46 pm 9/12/2020 get back to work
</commit_message>
<xml_diff>
--- a/Data Structures and Algorithms/Slides/Queue.pptx
+++ b/Data Structures and Algorithms/Slides/Queue.pptx
@@ -280,7 +280,7 @@
           <a:p>
             <a:fld id="{1D8BD707-D9CF-40AE-B4C6-C98DA3205C09}" type="datetimeFigureOut">
               <a:rPr lang="en-US"/>
-              <a:t>12/3/2020</a:t>
+              <a:t>12/8/2020</a:t>
             </a:fld>
             <a:endParaRPr lang="en-US"/>
           </a:p>
@@ -469,7 +469,7 @@
           <a:p>
             <a:fld id="{1D8BD707-D9CF-40AE-B4C6-C98DA3205C09}" type="datetimeFigureOut">
               <a:rPr lang="en-US"/>
-              <a:t>12/3/2020</a:t>
+              <a:t>12/8/2020</a:t>
             </a:fld>
             <a:endParaRPr lang="en-US"/>
           </a:p>
@@ -697,7 +697,7 @@
           <a:p>
             <a:fld id="{1D8BD707-D9CF-40AE-B4C6-C98DA3205C09}" type="datetimeFigureOut">
               <a:rPr lang="en-US"/>
-              <a:t>12/3/2020</a:t>
+              <a:t>12/8/2020</a:t>
             </a:fld>
             <a:endParaRPr lang="en-US"/>
           </a:p>
@@ -859,7 +859,7 @@
           <a:p>
             <a:fld id="{1D8BD707-D9CF-40AE-B4C6-C98DA3205C09}" type="datetimeFigureOut">
               <a:rPr lang="en-US"/>
-              <a:t>12/3/2020</a:t>
+              <a:t>12/8/2020</a:t>
             </a:fld>
             <a:endParaRPr lang="en-US"/>
           </a:p>
@@ -992,7 +992,7 @@
           <a:p>
             <a:fld id="{1D8BD707-D9CF-40AE-B4C6-C98DA3205C09}" type="datetimeFigureOut">
               <a:rPr lang="en-US"/>
-              <a:t>12/3/2020</a:t>
+              <a:t>12/8/2020</a:t>
             </a:fld>
             <a:endParaRPr lang="en-US"/>
           </a:p>
@@ -1229,7 +1229,7 @@
           <a:p>
             <a:fld id="{1D8BD707-D9CF-40AE-B4C6-C98DA3205C09}" type="datetimeFigureOut">
               <a:rPr lang="en-US"/>
-              <a:t>12/3/2020</a:t>
+              <a:t>12/8/2020</a:t>
             </a:fld>
             <a:endParaRPr lang="en-US"/>
           </a:p>
@@ -12612,7 +12612,7 @@
         </p:nvSpPr>
         <p:spPr>
           <a:xfrm>
-            <a:off x="6217920" y="0"/>
+            <a:off x="6238240" y="0"/>
             <a:ext cx="2926079" cy="6858000"/>
           </a:xfrm>
           <a:prstGeom prst="rect">
@@ -12825,7 +12825,7 @@
               </a:rPr>
               <a:t>=rear)</a:t>
             </a:r>
-            <a:endParaRPr sz="3200">
+            <a:endParaRPr sz="3200" dirty="0">
               <a:latin typeface="Arial"/>
               <a:cs typeface="Arial"/>
             </a:endParaRPr>
@@ -12879,7 +12879,7 @@
               </a:rPr>
               <a:t>return</a:t>
             </a:r>
-            <a:endParaRPr sz="3200">
+            <a:endParaRPr sz="3200" dirty="0">
               <a:latin typeface="Arial"/>
               <a:cs typeface="Arial"/>
             </a:endParaRPr>
@@ -12912,7 +12912,7 @@
               </a:rPr>
               <a:t>Else</a:t>
             </a:r>
-            <a:endParaRPr sz="3200">
+            <a:endParaRPr sz="3200" dirty="0">
               <a:latin typeface="Arial"/>
               <a:cs typeface="Arial"/>
             </a:endParaRPr>
@@ -12973,7 +12973,7 @@
               </a:rPr>
               <a:t> item</a:t>
             </a:r>
-            <a:endParaRPr sz="3200">
+            <a:endParaRPr sz="3200" dirty="0">
               <a:latin typeface="Arial"/>
               <a:cs typeface="Arial"/>
             </a:endParaRPr>

</xml_diff>